<commit_message>
Removed jsonload and use regex to extract text from AI Response
</commit_message>
<xml_diff>
--- a/output.pptx
+++ b/output.pptx
@@ -3090,14 +3090,35 @@
       <p:grpSpPr/>
       <p:sp>
         <p:nvSpPr>
-          <p:cNvPr id="2" name="TextBox 1"/>
+          <p:cNvPr id="2" name="Title 1"/>
+          <p:cNvSpPr>
+            <a:spLocks noGrp="1"/>
+          </p:cNvSpPr>
+          <p:nvPr>
+            <p:ph type="title"/>
+          </p:nvPr>
+        </p:nvSpPr>
+        <p:spPr/>
+        <p:txBody>
+          <a:bodyPr/>
+          <a:lstStyle/>
+          <a:p>
+            <a:r>
+              <a:t>Introduction to Android Reverse Engineering </a:t>
+            </a:r>
+          </a:p>
+        </p:txBody>
+      </p:sp>
+      <p:sp>
+        <p:nvSpPr>
+          <p:cNvPr id="3" name="TextBox 2"/>
           <p:cNvSpPr txBox="1"/>
           <p:nvPr/>
         </p:nvSpPr>
         <p:spPr>
           <a:xfrm>
-            <a:off x="228600" y="228600"/>
-            <a:ext cx="8229600" cy="457200"/>
+            <a:off x="914400" y="1371600"/>
+            <a:ext cx="7315200" cy="3657600"/>
           </a:xfrm>
           <a:prstGeom prst="rect">
             <a:avLst/>
@@ -3109,35 +3130,6 @@
             <a:spAutoFit/>
           </a:bodyPr>
           <a:lstStyle/>
-          <a:p>
-            <a:r>
-              <a:rPr sz="1400"/>
-              <a:t>Software Reverse engineering</a:t>
-            </a:r>
-          </a:p>
-        </p:txBody>
-      </p:sp>
-      <p:sp>
-        <p:nvSpPr>
-          <p:cNvPr id="3" name="TextBox 2"/>
-          <p:cNvSpPr txBox="1"/>
-          <p:nvPr/>
-        </p:nvSpPr>
-        <p:spPr>
-          <a:xfrm>
-            <a:off x="228600" y="685800"/>
-            <a:ext cx="8229600" cy="3657600"/>
-          </a:xfrm>
-          <a:prstGeom prst="rect">
-            <a:avLst/>
-          </a:prstGeom>
-          <a:noFill/>
-        </p:spPr>
-        <p:txBody>
-          <a:bodyPr wrap="square">
-            <a:spAutoFit/>
-          </a:bodyPr>
-          <a:lstStyle/>
           <a:p/>
           <a:p>
             <a:r>
@@ -3146,19 +3138,313 @@
             </a:r>
             <a:r>
               <a:rPr b="1" sz="1400"/>
-              <a:t>Real-World </a:t>
+              <a:t>Understanding </a:t>
+            </a:r>
+            <a:r>
+              <a:rPr sz="1400"/>
+              <a:t>the </a:t>
+            </a:r>
+            <a:r>
+              <a:rPr sz="1400"/>
+              <a:t>Inner </a:t>
             </a:r>
             <a:r>
               <a:rPr b="1" sz="1400"/>
+              <a:t>Workings: </a:t>
+            </a:r>
+            <a:r>
+              <a:rPr sz="1400"/>
               <a:t>Reverse </a:t>
             </a:r>
             <a:r>
+              <a:rPr sz="1400"/>
+              <a:t>engineering </a:t>
+            </a:r>
+            <a:r>
+              <a:rPr sz="1400"/>
+              <a:t>delves </a:t>
+            </a:r>
+            <a:r>
+              <a:rPr sz="1400"/>
+              <a:t>into </a:t>
+            </a:r>
+            <a:r>
+              <a:rPr sz="1400"/>
+              <a:t>the </a:t>
+            </a:r>
+            <a:r>
+              <a:rPr sz="1400"/>
+              <a:t>core </a:t>
+            </a:r>
+            <a:r>
+              <a:rPr sz="1400"/>
+              <a:t>of </a:t>
+            </a:r>
+            <a:r>
+              <a:rPr sz="1400"/>
+              <a:t>Android </a:t>
+            </a:r>
+            <a:r>
+              <a:rPr sz="1400"/>
+              <a:t>applications, </a:t>
+            </a:r>
+            <a:r>
+              <a:rPr sz="1400"/>
+              <a:t>dissecting </a:t>
+            </a:r>
+            <a:r>
+              <a:rPr sz="1400"/>
+              <a:t>their </a:t>
+            </a:r>
+            <a:r>
+              <a:rPr sz="1400"/>
+              <a:t>functionality, </a:t>
+            </a:r>
+            <a:r>
+              <a:rPr sz="1400"/>
+              <a:t>architecture, </a:t>
+            </a:r>
+            <a:r>
+              <a:rPr sz="1400"/>
+              <a:t>and </a:t>
+            </a:r>
+            <a:r>
+              <a:rPr sz="1400"/>
+              <a:t>underlying </a:t>
+            </a:r>
+            <a:r>
+              <a:rPr sz="1400"/>
+              <a:t>code. </a:t>
+            </a:r>
+            <a:r>
+              <a:rPr sz="1400"/>
+              <a:t>It's </a:t>
+            </a:r>
+            <a:r>
+              <a:rPr sz="1400"/>
+              <a:t>like </a:t>
+            </a:r>
+            <a:r>
+              <a:rPr sz="1400"/>
+              <a:t>peeling </a:t>
+            </a:r>
+            <a:r>
+              <a:rPr sz="1400"/>
+              <a:t>back </a:t>
+            </a:r>
+            <a:r>
+              <a:rPr sz="1400"/>
+              <a:t>the </a:t>
+            </a:r>
+            <a:r>
+              <a:rPr sz="1400"/>
+              <a:t>layers </a:t>
+            </a:r>
+            <a:r>
+              <a:rPr sz="1400"/>
+              <a:t>of </a:t>
+            </a:r>
+            <a:r>
+              <a:rPr sz="1400"/>
+              <a:t>an </a:t>
+            </a:r>
+            <a:r>
+              <a:rPr sz="1400"/>
+              <a:t>onion </a:t>
+            </a:r>
+            <a:r>
+              <a:rPr sz="1400"/>
+              <a:t>to </a:t>
+            </a:r>
+            <a:r>
+              <a:rPr sz="1400"/>
+              <a:t>see </a:t>
+            </a:r>
+            <a:r>
+              <a:rPr sz="1400"/>
+              <a:t>how </a:t>
+            </a:r>
+            <a:r>
+              <a:rPr sz="1400"/>
+              <a:t>each </a:t>
+            </a:r>
+            <a:r>
+              <a:rPr sz="1400"/>
+              <a:t>component </a:t>
+            </a:r>
+            <a:r>
+              <a:rPr sz="1400"/>
+              <a:t>contributes </a:t>
+            </a:r>
+            <a:r>
+              <a:rPr sz="1400"/>
+              <a:t>to </a:t>
+            </a:r>
+            <a:r>
+              <a:rPr sz="1400"/>
+              <a:t>the </a:t>
+            </a:r>
+            <a:r>
+              <a:rPr sz="1400"/>
+              <a:t>overall </a:t>
+            </a:r>
+            <a:r>
+              <a:rPr sz="1400"/>
+              <a:t>behavior. </a:t>
+            </a:r>
+          </a:p>
+          <a:p>
+            <a:r>
+              <a:rPr sz="1400"/>
+              <a:t>- </a:t>
+            </a:r>
+            <a:r>
               <a:rPr b="1" sz="1400"/>
-              <a:t>Engineering </a:t>
+              <a:t>Unveiling </a:t>
+            </a:r>
+            <a:r>
+              <a:rPr sz="1400"/>
+              <a:t>Hidden </a:t>
             </a:r>
             <a:r>
               <a:rPr b="1" sz="1400"/>
-              <a:t>Cases:** </a:t>
+              <a:t>Secrets: </a:t>
+            </a:r>
+            <a:r>
+              <a:rPr sz="1400"/>
+              <a:t>By </a:t>
+            </a:r>
+            <a:r>
+              <a:rPr sz="1400"/>
+              <a:t>reverse </a:t>
+            </a:r>
+            <a:r>
+              <a:rPr sz="1400"/>
+              <a:t>engineering, </a:t>
+            </a:r>
+            <a:r>
+              <a:rPr sz="1400"/>
+              <a:t>we </a:t>
+            </a:r>
+            <a:r>
+              <a:rPr sz="1400"/>
+              <a:t>can </a:t>
+            </a:r>
+            <a:r>
+              <a:rPr sz="1400"/>
+              <a:t>uncover </a:t>
+            </a:r>
+            <a:r>
+              <a:rPr sz="1400"/>
+              <a:t>hidden </a:t>
+            </a:r>
+            <a:r>
+              <a:rPr sz="1400"/>
+              <a:t>features, </a:t>
+            </a:r>
+            <a:r>
+              <a:rPr sz="1400"/>
+              <a:t>secret </a:t>
+            </a:r>
+            <a:r>
+              <a:rPr sz="1400"/>
+              <a:t>APIs, </a:t>
+            </a:r>
+            <a:r>
+              <a:rPr sz="1400"/>
+              <a:t>and </a:t>
+            </a:r>
+            <a:r>
+              <a:rPr sz="1400"/>
+              <a:t>undocumented </a:t>
+            </a:r>
+            <a:r>
+              <a:rPr sz="1400"/>
+              <a:t>behaviors </a:t>
+            </a:r>
+            <a:r>
+              <a:rPr sz="1400"/>
+              <a:t>that </a:t>
+            </a:r>
+            <a:r>
+              <a:rPr sz="1400"/>
+              <a:t>are </a:t>
+            </a:r>
+            <a:r>
+              <a:rPr sz="1400"/>
+              <a:t>not </a:t>
+            </a:r>
+            <a:r>
+              <a:rPr sz="1400"/>
+              <a:t>readily </a:t>
+            </a:r>
+            <a:r>
+              <a:rPr sz="1400"/>
+              <a:t>apparent </a:t>
+            </a:r>
+            <a:r>
+              <a:rPr sz="1400"/>
+              <a:t>from </a:t>
+            </a:r>
+            <a:r>
+              <a:rPr sz="1400"/>
+              <a:t>the </a:t>
+            </a:r>
+            <a:r>
+              <a:rPr sz="1400"/>
+              <a:t>app's </a:t>
+            </a:r>
+            <a:r>
+              <a:rPr sz="1400"/>
+              <a:t>surface. </a:t>
+            </a:r>
+            <a:r>
+              <a:rPr sz="1400"/>
+              <a:t>This </a:t>
+            </a:r>
+            <a:r>
+              <a:rPr sz="1400"/>
+              <a:t>knowledge </a:t>
+            </a:r>
+            <a:r>
+              <a:rPr sz="1400"/>
+              <a:t>can </a:t>
+            </a:r>
+            <a:r>
+              <a:rPr sz="1400"/>
+              <a:t>be </a:t>
+            </a:r>
+            <a:r>
+              <a:rPr sz="1400"/>
+              <a:t>invaluable </a:t>
+            </a:r>
+            <a:r>
+              <a:rPr sz="1400"/>
+              <a:t>for </a:t>
+            </a:r>
+            <a:r>
+              <a:rPr sz="1400"/>
+              <a:t>developers, </a:t>
+            </a:r>
+            <a:r>
+              <a:rPr sz="1400"/>
+              <a:t>security </a:t>
+            </a:r>
+            <a:r>
+              <a:rPr sz="1400"/>
+              <a:t>researchers, </a:t>
+            </a:r>
+            <a:r>
+              <a:rPr sz="1400"/>
+              <a:t>and </a:t>
+            </a:r>
+            <a:r>
+              <a:rPr sz="1400"/>
+              <a:t>enthusiasts </a:t>
+            </a:r>
+            <a:r>
+              <a:rPr sz="1400"/>
+              <a:t>alike. </a:t>
             </a:r>
           </a:p>
           <a:p>
@@ -3167,16 +3453,262 @@
               <a:t>- </a:t>
             </a:r>
             <a:r>
-              <a:rPr sz="1400"/>
-              <a:t>Atari </a:t>
-            </a:r>
-            <a:r>
-              <a:rPr sz="1400"/>
-              <a:t>v. </a:t>
-            </a:r>
-            <a:r>
-              <a:rPr sz="1400"/>
-              <a:t>Nintendo: </a:t>
+              <a:rPr b="1" sz="1400"/>
+              <a:t>Security </a:t>
+            </a:r>
+            <a:r>
+              <a:rPr sz="1400"/>
+              <a:t>Vulnerability </a:t>
+            </a:r>
+            <a:r>
+              <a:rPr b="1" sz="1400"/>
+              <a:t>Analysis: </a:t>
+            </a:r>
+            <a:r>
+              <a:rPr sz="1400"/>
+              <a:t>Reverse </a:t>
+            </a:r>
+            <a:r>
+              <a:rPr sz="1400"/>
+              <a:t>engineering </a:t>
+            </a:r>
+            <a:r>
+              <a:rPr sz="1400"/>
+              <a:t>plays </a:t>
+            </a:r>
+            <a:r>
+              <a:rPr sz="1400"/>
+              <a:t>a </a:t>
+            </a:r>
+            <a:r>
+              <a:rPr sz="1400"/>
+              <a:t>crucial </a:t>
+            </a:r>
+            <a:r>
+              <a:rPr sz="1400"/>
+              <a:t>role </a:t>
+            </a:r>
+            <a:r>
+              <a:rPr sz="1400"/>
+              <a:t>in </a:t>
+            </a:r>
+            <a:r>
+              <a:rPr sz="1400"/>
+              <a:t>identifying </a:t>
+            </a:r>
+            <a:r>
+              <a:rPr sz="1400"/>
+              <a:t>security </a:t>
+            </a:r>
+            <a:r>
+              <a:rPr sz="1400"/>
+              <a:t>loopholes </a:t>
+            </a:r>
+            <a:r>
+              <a:rPr sz="1400"/>
+              <a:t>and </a:t>
+            </a:r>
+            <a:r>
+              <a:rPr sz="1400"/>
+              <a:t>potential </a:t>
+            </a:r>
+            <a:r>
+              <a:rPr sz="1400"/>
+              <a:t>exploits </a:t>
+            </a:r>
+            <a:r>
+              <a:rPr sz="1400"/>
+              <a:t>within </a:t>
+            </a:r>
+            <a:r>
+              <a:rPr sz="1400"/>
+              <a:t>Android </a:t>
+            </a:r>
+            <a:r>
+              <a:rPr sz="1400"/>
+              <a:t>applications. </a:t>
+            </a:r>
+            <a:r>
+              <a:rPr sz="1400"/>
+              <a:t>By </a:t>
+            </a:r>
+            <a:r>
+              <a:rPr sz="1400"/>
+              <a:t>understanding </a:t>
+            </a:r>
+            <a:r>
+              <a:rPr sz="1400"/>
+              <a:t>how </a:t>
+            </a:r>
+            <a:r>
+              <a:rPr sz="1400"/>
+              <a:t>an </a:t>
+            </a:r>
+            <a:r>
+              <a:rPr sz="1400"/>
+              <a:t>app </a:t>
+            </a:r>
+            <a:r>
+              <a:rPr sz="1400"/>
+              <a:t>works, </a:t>
+            </a:r>
+            <a:r>
+              <a:rPr sz="1400"/>
+              <a:t>we </a:t>
+            </a:r>
+            <a:r>
+              <a:rPr sz="1400"/>
+              <a:t>can </a:t>
+            </a:r>
+            <a:r>
+              <a:rPr sz="1400"/>
+              <a:t>pinpoint </a:t>
+            </a:r>
+            <a:r>
+              <a:rPr sz="1400"/>
+              <a:t>weaknesses </a:t>
+            </a:r>
+            <a:r>
+              <a:rPr sz="1400"/>
+              <a:t>in </a:t>
+            </a:r>
+            <a:r>
+              <a:rPr sz="1400"/>
+              <a:t>its </a:t>
+            </a:r>
+            <a:r>
+              <a:rPr sz="1400"/>
+              <a:t>design </a:t>
+            </a:r>
+            <a:r>
+              <a:rPr sz="1400"/>
+              <a:t>and </a:t>
+            </a:r>
+            <a:r>
+              <a:rPr sz="1400"/>
+              <a:t>implementation, </a:t>
+            </a:r>
+            <a:r>
+              <a:rPr sz="1400"/>
+              <a:t>leading </a:t>
+            </a:r>
+            <a:r>
+              <a:rPr sz="1400"/>
+              <a:t>to </a:t>
+            </a:r>
+            <a:r>
+              <a:rPr sz="1400"/>
+              <a:t>more </a:t>
+            </a:r>
+            <a:r>
+              <a:rPr sz="1400"/>
+              <a:t>secure </a:t>
+            </a:r>
+            <a:r>
+              <a:rPr sz="1400"/>
+              <a:t>and </a:t>
+            </a:r>
+            <a:r>
+              <a:rPr sz="1400"/>
+              <a:t>robust </a:t>
+            </a:r>
+            <a:r>
+              <a:rPr sz="1400"/>
+              <a:t>software. </a:t>
+            </a:r>
+          </a:p>
+          <a:p>
+            <a:r>
+              <a:rPr sz="1400"/>
+              <a:t>- </a:t>
+            </a:r>
+            <a:r>
+              <a:rPr b="1" sz="1400"/>
+              <a:t>Customization </a:t>
+            </a:r>
+            <a:r>
+              <a:rPr sz="1400"/>
+              <a:t>and </a:t>
+            </a:r>
+            <a:r>
+              <a:rPr b="1" sz="1400"/>
+              <a:t>Modification: </a:t>
+            </a:r>
+            <a:r>
+              <a:rPr sz="1400"/>
+              <a:t>Through </a:t>
+            </a:r>
+            <a:r>
+              <a:rPr sz="1400"/>
+              <a:t>reverse </a:t>
+            </a:r>
+            <a:r>
+              <a:rPr sz="1400"/>
+              <a:t>engineering, </a:t>
+            </a:r>
+            <a:r>
+              <a:rPr sz="1400"/>
+              <a:t>we </a:t>
+            </a:r>
+            <a:r>
+              <a:rPr sz="1400"/>
+              <a:t>gain </a:t>
+            </a:r>
+            <a:r>
+              <a:rPr sz="1400"/>
+              <a:t>the </a:t>
+            </a:r>
+            <a:r>
+              <a:rPr sz="1400"/>
+              <a:t>ability </a:t>
+            </a:r>
+            <a:r>
+              <a:rPr sz="1400"/>
+              <a:t>to </a:t>
+            </a:r>
+            <a:r>
+              <a:rPr sz="1400"/>
+              <a:t>modify </a:t>
+            </a:r>
+            <a:r>
+              <a:rPr sz="1400"/>
+              <a:t>existing </a:t>
+            </a:r>
+            <a:r>
+              <a:rPr sz="1400"/>
+              <a:t>applications, </a:t>
+            </a:r>
+            <a:r>
+              <a:rPr sz="1400"/>
+              <a:t>tailoring </a:t>
+            </a:r>
+            <a:r>
+              <a:rPr sz="1400"/>
+              <a:t>them </a:t>
+            </a:r>
+            <a:r>
+              <a:rPr sz="1400"/>
+              <a:t>to </a:t>
+            </a:r>
+            <a:r>
+              <a:rPr sz="1400"/>
+              <a:t>our </a:t>
+            </a:r>
+            <a:r>
+              <a:rPr sz="1400"/>
+              <a:t>specific </a:t>
+            </a:r>
+            <a:r>
+              <a:rPr sz="1400"/>
+              <a:t>needs </a:t>
+            </a:r>
+            <a:r>
+              <a:rPr sz="1400"/>
+              <a:t>or </a:t>
+            </a:r>
+            <a:r>
+              <a:rPr sz="1400"/>
+              <a:t>preferences. </a:t>
             </a:r>
             <a:r>
               <a:rPr sz="1400"/>
@@ -3184,169 +3716,67 @@
             </a:r>
             <a:r>
               <a:rPr sz="1400"/>
-              <a:t>landmark </a:t>
-            </a:r>
-            <a:r>
-              <a:rPr sz="1400"/>
-              <a:t>case </a:t>
-            </a:r>
-            <a:r>
-              <a:rPr sz="1400"/>
-              <a:t>set </a:t>
-            </a:r>
-            <a:r>
-              <a:rPr sz="1400"/>
-              <a:t>a </a:t>
-            </a:r>
-            <a:r>
-              <a:rPr sz="1400"/>
-              <a:t>precedent </a:t>
-            </a:r>
-            <a:r>
-              <a:rPr sz="1400"/>
-              <a:t>for </a:t>
-            </a:r>
-            <a:r>
-              <a:rPr sz="1400"/>
-              <a:t>fair </a:t>
-            </a:r>
-            <a:r>
-              <a:rPr sz="1400"/>
-              <a:t>use </a:t>
-            </a:r>
-            <a:r>
-              <a:rPr sz="1400"/>
-              <a:t>in </a:t>
-            </a:r>
-            <a:r>
-              <a:rPr sz="1400"/>
-              <a:t>reverse </a:t>
-            </a:r>
-            <a:r>
-              <a:rPr sz="1400"/>
-              <a:t>engineering. </a:t>
-            </a:r>
-            <a:r>
-              <a:rPr sz="1400"/>
-              <a:t>Atari </a:t>
-            </a:r>
-            <a:r>
-              <a:rPr sz="1400"/>
-              <a:t>successfully </a:t>
-            </a:r>
-            <a:r>
-              <a:rPr sz="1400"/>
-              <a:t>argued </a:t>
-            </a:r>
-            <a:r>
-              <a:rPr sz="1400"/>
-              <a:t>that </a:t>
-            </a:r>
-            <a:r>
-              <a:rPr sz="1400"/>
-              <a:t>they </a:t>
-            </a:r>
-            <a:r>
-              <a:rPr sz="1400"/>
-              <a:t>needed </a:t>
-            </a:r>
-            <a:r>
-              <a:rPr sz="1400"/>
-              <a:t>to </a:t>
-            </a:r>
-            <a:r>
-              <a:rPr sz="1400"/>
-              <a:t>reverse </a:t>
-            </a:r>
-            <a:r>
-              <a:rPr sz="1400"/>
-              <a:t>engineer </a:t>
-            </a:r>
-            <a:r>
-              <a:rPr sz="1400"/>
-              <a:t>Nintendo's </a:t>
-            </a:r>
-            <a:r>
-              <a:rPr sz="1400"/>
-              <a:t>lockout </a:t>
-            </a:r>
-            <a:r>
-              <a:rPr sz="1400"/>
-              <a:t>chip </a:t>
-            </a:r>
-            <a:r>
-              <a:rPr sz="1400"/>
-              <a:t>to </a:t>
-            </a:r>
-            <a:r>
-              <a:rPr sz="1400"/>
-              <a:t>create </a:t>
-            </a:r>
-            <a:r>
-              <a:rPr sz="1400"/>
-              <a:t>compatible </a:t>
-            </a:r>
-            <a:r>
-              <a:rPr sz="1400"/>
-              <a:t>games, </a:t>
-            </a:r>
-            <a:r>
-              <a:rPr sz="1400"/>
-              <a:t>and </a:t>
-            </a:r>
-            <a:r>
-              <a:rPr sz="1400"/>
-              <a:t>this </a:t>
-            </a:r>
-            <a:r>
-              <a:rPr sz="1400"/>
-              <a:t>was </a:t>
-            </a:r>
-            <a:r>
-              <a:rPr sz="1400"/>
-              <a:t>deemed </a:t>
-            </a:r>
-            <a:r>
-              <a:rPr sz="1400"/>
-              <a:t>permissible </a:t>
-            </a:r>
-            <a:r>
-              <a:rPr sz="1400"/>
-              <a:t>under </a:t>
-            </a:r>
-            <a:r>
-              <a:rPr sz="1400"/>
-              <a:t>copyright </a:t>
-            </a:r>
-            <a:r>
-              <a:rPr sz="1400"/>
-              <a:t>law. </a:t>
-            </a:r>
-          </a:p>
-          <a:p>
-            <a:r>
-              <a:rPr sz="1400"/>
-              <a:t>- </a:t>
-            </a:r>
-            <a:r>
-              <a:rPr sz="1400"/>
-              <a:t>Accolade </a:t>
-            </a:r>
-            <a:r>
-              <a:rPr sz="1400"/>
-              <a:t>v. </a:t>
-            </a:r>
-            <a:r>
-              <a:rPr sz="1400"/>
-              <a:t>Sega: </a:t>
-            </a:r>
-            <a:r>
-              <a:rPr sz="1400"/>
-              <a:t>Similar </a:t>
-            </a:r>
-            <a:r>
-              <a:rPr sz="1400"/>
-              <a:t>to </a:t>
+              <a:t>could </a:t>
+            </a:r>
+            <a:r>
+              <a:rPr sz="1400"/>
+              <a:t>involve </a:t>
+            </a:r>
+            <a:r>
+              <a:rPr sz="1400"/>
+              <a:t>adding </a:t>
+            </a:r>
+            <a:r>
+              <a:rPr sz="1400"/>
+              <a:t>new </a:t>
+            </a:r>
+            <a:r>
+              <a:rPr sz="1400"/>
+              <a:t>features, </a:t>
+            </a:r>
+            <a:r>
+              <a:rPr sz="1400"/>
+              <a:t>removing </a:t>
+            </a:r>
+            <a:r>
+              <a:rPr sz="1400"/>
+              <a:t>unwanted </a:t>
+            </a:r>
+            <a:r>
+              <a:rPr sz="1400"/>
+              <a:t>elements, </a:t>
+            </a:r>
+            <a:r>
+              <a:rPr sz="1400"/>
+              <a:t>or </a:t>
+            </a:r>
+            <a:r>
+              <a:rPr sz="1400"/>
+              <a:t>even </a:t>
+            </a:r>
+            <a:r>
+              <a:rPr sz="1400"/>
+              <a:t>creating </a:t>
+            </a:r>
+            <a:r>
+              <a:rPr sz="1400"/>
+              <a:t>entirely </a:t>
+            </a:r>
+            <a:r>
+              <a:rPr sz="1400"/>
+              <a:t>new </a:t>
+            </a:r>
+            <a:r>
+              <a:rPr sz="1400"/>
+              <a:t>apps </a:t>
+            </a:r>
+            <a:r>
+              <a:rPr sz="1400"/>
+              <a:t>based </a:t>
+            </a:r>
+            <a:r>
+              <a:rPr sz="1400"/>
+              <a:t>on </a:t>
             </a:r>
             <a:r>
               <a:rPr sz="1400"/>
@@ -3354,19 +3784,15 @@
             </a:r>
             <a:r>
               <a:rPr sz="1400"/>
-              <a:t>Atari </a:t>
-            </a:r>
-            <a:r>
-              <a:rPr sz="1400"/>
-              <a:t>case, </a:t>
-            </a:r>
-            <a:r>
-              <a:rPr sz="1400"/>
-              <a:t>Accolade </a:t>
-            </a:r>
-            <a:r>
-              <a:rPr sz="1400"/>
-              <a:t>demonstrated </a:t>
+              <a:t>insights </a:t>
+            </a:r>
+            <a:r>
+              <a:rPr sz="1400"/>
+              <a:t>gained </a:t>
+            </a:r>
+            <a:r>
+              <a:rPr sz="1400"/>
+              <a:t>from </a:t>
             </a:r>
             <a:r>
               <a:rPr sz="1400"/>
@@ -3374,845 +3800,60 @@
             </a:r>
             <a:r>
               <a:rPr sz="1400"/>
-              <a:t>need </a:t>
-            </a:r>
-            <a:r>
-              <a:rPr sz="1400"/>
-              <a:t>to </a:t>
-            </a:r>
-            <a:r>
-              <a:rPr sz="1400"/>
-              <a:t>reverse </a:t>
-            </a:r>
-            <a:r>
-              <a:rPr sz="1400"/>
-              <a:t>engineer </a:t>
-            </a:r>
-            <a:r>
-              <a:rPr sz="1400"/>
-              <a:t>Sega's </a:t>
-            </a:r>
-            <a:r>
-              <a:rPr sz="1400"/>
-              <a:t>console </a:t>
-            </a:r>
-            <a:r>
-              <a:rPr sz="1400"/>
-              <a:t>to </a:t>
-            </a:r>
-            <a:r>
-              <a:rPr sz="1400"/>
-              <a:t>create </a:t>
-            </a:r>
-            <a:r>
-              <a:rPr sz="1400"/>
-              <a:t>compatible </a:t>
-            </a:r>
-            <a:r>
-              <a:rPr sz="1400"/>
-              <a:t>games. </a:t>
-            </a:r>
-            <a:r>
-              <a:rPr sz="1400"/>
-              <a:t>This </a:t>
-            </a:r>
-            <a:r>
-              <a:rPr sz="1400"/>
-              <a:t>further </a:t>
-            </a:r>
-            <a:r>
-              <a:rPr sz="1400"/>
-              <a:t>solidified </a:t>
-            </a:r>
-            <a:r>
-              <a:rPr sz="1400"/>
-              <a:t>the </a:t>
-            </a:r>
-            <a:r>
-              <a:rPr sz="1400"/>
-              <a:t>concept </a:t>
-            </a:r>
-            <a:r>
-              <a:rPr sz="1400"/>
-              <a:t>of </a:t>
-            </a:r>
-            <a:r>
-              <a:rPr sz="1400"/>
-              <a:t>fair </a:t>
-            </a:r>
-            <a:r>
-              <a:rPr sz="1400"/>
-              <a:t>use </a:t>
-            </a:r>
-            <a:r>
-              <a:rPr sz="1400"/>
-              <a:t>in </a:t>
-            </a:r>
-            <a:r>
-              <a:rPr sz="1400"/>
-              <a:t>the </a:t>
-            </a:r>
-            <a:r>
-              <a:rPr sz="1400"/>
-              <a:t>context </a:t>
-            </a:r>
-            <a:r>
-              <a:rPr sz="1400"/>
-              <a:t>of </a:t>
-            </a:r>
-            <a:r>
-              <a:rPr sz="1400"/>
-              <a:t>interoperability. </a:t>
-            </a:r>
-          </a:p>
-          <a:p>
-            <a:r>
-              <a:rPr sz="1400"/>
-              <a:t>- </a:t>
-            </a:r>
-            <a:r>
-              <a:rPr sz="1400"/>
-              <a:t>Phoenix </a:t>
-            </a:r>
-            <a:r>
-              <a:rPr sz="1400"/>
-              <a:t>v. </a:t>
-            </a:r>
-            <a:r>
-              <a:rPr sz="1400"/>
-              <a:t>IBM </a:t>
-            </a:r>
-            <a:r>
-              <a:rPr sz="1400"/>
-              <a:t>(BIOS): </a:t>
-            </a:r>
-            <a:r>
-              <a:rPr sz="1400"/>
-              <a:t>This </a:t>
-            </a:r>
-            <a:r>
-              <a:rPr sz="1400"/>
-              <a:t>case </a:t>
-            </a:r>
-            <a:r>
-              <a:rPr sz="1400"/>
-              <a:t>delved </a:t>
-            </a:r>
-            <a:r>
-              <a:rPr sz="1400"/>
-              <a:t>into </a:t>
-            </a:r>
-            <a:r>
-              <a:rPr sz="1400"/>
-              <a:t>the </a:t>
-            </a:r>
-            <a:r>
-              <a:rPr sz="1400"/>
-              <a:t>complexities </a:t>
-            </a:r>
-            <a:r>
-              <a:rPr sz="1400"/>
-              <a:t>of </a:t>
-            </a:r>
-            <a:r>
-              <a:rPr sz="1400"/>
-              <a:t>intellectual </a:t>
-            </a:r>
-            <a:r>
-              <a:rPr sz="1400"/>
-              <a:t>property </a:t>
-            </a:r>
-            <a:r>
-              <a:rPr sz="1400"/>
-              <a:t>protection </a:t>
-            </a:r>
-            <a:r>
-              <a:rPr sz="1400"/>
-              <a:t>for </a:t>
-            </a:r>
-            <a:r>
-              <a:rPr sz="1400"/>
-              <a:t>BIOS </a:t>
-            </a:r>
-            <a:r>
-              <a:rPr sz="1400"/>
-              <a:t>software. </a:t>
-            </a:r>
-            <a:r>
-              <a:rPr sz="1400"/>
-              <a:t>The </a:t>
-            </a:r>
-            <a:r>
-              <a:rPr sz="1400"/>
-              <a:t>court </a:t>
-            </a:r>
-            <a:r>
-              <a:rPr sz="1400"/>
-              <a:t>ruled </a:t>
-            </a:r>
-            <a:r>
-              <a:rPr sz="1400"/>
-              <a:t>that </a:t>
-            </a:r>
-            <a:r>
-              <a:rPr sz="1400"/>
-              <a:t>while </a:t>
-            </a:r>
-            <a:r>
-              <a:rPr sz="1400"/>
-              <a:t>some </a:t>
-            </a:r>
-            <a:r>
-              <a:rPr sz="1400"/>
-              <a:t>aspects </a:t>
-            </a:r>
-            <a:r>
-              <a:rPr sz="1400"/>
-              <a:t>of </a:t>
-            </a:r>
-            <a:r>
-              <a:rPr sz="1400"/>
-              <a:t>BIOS </a:t>
-            </a:r>
-            <a:r>
-              <a:rPr sz="1400"/>
-              <a:t>were </a:t>
-            </a:r>
-            <a:r>
-              <a:rPr sz="1400"/>
-              <a:t>copyrightable, </a:t>
-            </a:r>
-            <a:r>
-              <a:rPr sz="1400"/>
-              <a:t>functional </a:t>
-            </a:r>
-            <a:r>
-              <a:rPr sz="1400"/>
-              <a:t>elements </a:t>
-            </a:r>
-            <a:r>
-              <a:rPr sz="1400"/>
-              <a:t>necessary </a:t>
-            </a:r>
-            <a:r>
-              <a:rPr sz="1400"/>
-              <a:t>for </a:t>
-            </a:r>
-            <a:r>
-              <a:rPr sz="1400"/>
-              <a:t>compatibility </a:t>
-            </a:r>
-            <a:r>
-              <a:rPr sz="1400"/>
-              <a:t>were </a:t>
-            </a:r>
-            <a:r>
-              <a:rPr sz="1400"/>
-              <a:t>not, </a:t>
-            </a:r>
-            <a:r>
-              <a:rPr sz="1400"/>
-              <a:t>allowing </a:t>
-            </a:r>
-            <a:r>
-              <a:rPr sz="1400"/>
-              <a:t>for </a:t>
-            </a:r>
-            <a:r>
-              <a:rPr sz="1400"/>
-              <a:t>limited </a:t>
-            </a:r>
-            <a:r>
-              <a:rPr sz="1400"/>
-              <a:t>reverse </a:t>
-            </a:r>
-            <a:r>
-              <a:rPr sz="1400"/>
-              <a:t>engineering. </a:t>
-            </a:r>
-          </a:p>
-          <a:p>
-            <a:r>
-              <a:rPr sz="1400"/>
-              <a:t>- </a:t>
-            </a:r>
-            <a:r>
-              <a:rPr sz="1400"/>
-              <a:t>Connectix </a:t>
-            </a:r>
-            <a:r>
-              <a:rPr sz="1400"/>
-              <a:t>v. </a:t>
-            </a:r>
-            <a:r>
-              <a:rPr sz="1400"/>
-              <a:t>Sony: </a:t>
-            </a:r>
-            <a:r>
-              <a:rPr sz="1400"/>
-              <a:t>This </a:t>
-            </a:r>
-            <a:r>
-              <a:rPr sz="1400"/>
-              <a:t>case </a:t>
-            </a:r>
-            <a:r>
-              <a:rPr sz="1400"/>
-              <a:t>explored </a:t>
-            </a:r>
-            <a:r>
-              <a:rPr sz="1400"/>
-              <a:t>the </a:t>
-            </a:r>
-            <a:r>
-              <a:rPr sz="1400"/>
-              <a:t>boundaries </a:t>
-            </a:r>
-            <a:r>
-              <a:rPr sz="1400"/>
-              <a:t>of </a:t>
-            </a:r>
-            <a:r>
-              <a:rPr sz="1400"/>
-              <a:t>reverse </a:t>
-            </a:r>
-            <a:r>
-              <a:rPr sz="1400"/>
-              <a:t>engineering </a:t>
-            </a:r>
-            <a:r>
-              <a:rPr sz="1400"/>
-              <a:t>in </a:t>
-            </a:r>
-            <a:r>
-              <a:rPr sz="1400"/>
-              <a:t>the </a:t>
-            </a:r>
-            <a:r>
-              <a:rPr sz="1400"/>
-              <a:t>context </a:t>
-            </a:r>
-            <a:r>
-              <a:rPr sz="1400"/>
-              <a:t>of </a:t>
-            </a:r>
-            <a:r>
-              <a:rPr sz="1400"/>
-              <a:t>creating </a:t>
-            </a:r>
-            <a:r>
-              <a:rPr sz="1400"/>
-              <a:t>emulation </a:t>
-            </a:r>
-            <a:r>
-              <a:rPr sz="1400"/>
-              <a:t>software. </a:t>
-            </a:r>
-            <a:r>
-              <a:rPr sz="1400"/>
-              <a:t>Connectix </a:t>
-            </a:r>
-            <a:r>
-              <a:rPr sz="1400"/>
-              <a:t>successfully </a:t>
-            </a:r>
-            <a:r>
-              <a:rPr sz="1400"/>
-              <a:t>argued </a:t>
-            </a:r>
-            <a:r>
-              <a:rPr sz="1400"/>
-              <a:t>that </a:t>
-            </a:r>
-            <a:r>
-              <a:rPr sz="1400"/>
-              <a:t>their </a:t>
-            </a:r>
-            <a:r>
-              <a:rPr sz="1400"/>
-              <a:t>reverse </a:t>
-            </a:r>
-            <a:r>
-              <a:rPr sz="1400"/>
-              <a:t>engineering </a:t>
-            </a:r>
-            <a:r>
-              <a:rPr sz="1400"/>
-              <a:t>of </a:t>
-            </a:r>
-            <a:r>
-              <a:rPr sz="1400"/>
-              <a:t>Sony's </a:t>
-            </a:r>
-            <a:r>
-              <a:rPr sz="1400"/>
-              <a:t>PlayStation </a:t>
-            </a:r>
-            <a:r>
-              <a:rPr sz="1400"/>
-              <a:t>BIOS </a:t>
-            </a:r>
-            <a:r>
-              <a:rPr sz="1400"/>
-              <a:t>was </a:t>
-            </a:r>
-            <a:r>
-              <a:rPr sz="1400"/>
-              <a:t>essential </a:t>
-            </a:r>
-            <a:r>
-              <a:rPr sz="1400"/>
-              <a:t>for </a:t>
-            </a:r>
-            <a:r>
-              <a:rPr sz="1400"/>
-              <a:t>creating </a:t>
-            </a:r>
-            <a:r>
-              <a:rPr sz="1400"/>
-              <a:t>a </a:t>
-            </a:r>
-            <a:r>
-              <a:rPr sz="1400"/>
-              <a:t>compatible </a:t>
-            </a:r>
-            <a:r>
-              <a:rPr sz="1400"/>
-              <a:t>emulator, </a:t>
-            </a:r>
-            <a:r>
-              <a:rPr sz="1400"/>
-              <a:t>falling </a:t>
-            </a:r>
-            <a:r>
-              <a:rPr sz="1400"/>
-              <a:t>under </a:t>
-            </a:r>
-            <a:r>
-              <a:rPr sz="1400"/>
-              <a:t>fair </a:t>
-            </a:r>
-            <a:r>
-              <a:rPr sz="1400"/>
-              <a:t>use. </a:t>
+              <a:t>analysis. </a:t>
             </a:r>
           </a:p>
           <a:p/>
           <a:p>
             <a:r>
-              <a:rPr sz="1400"/>
-              <a:t>- </a:t>
-            </a:r>
-            <a:r>
-              <a:rPr b="1" sz="1400"/>
-              <a:t>Legal </a:t>
-            </a:r>
-            <a:r>
-              <a:rPr b="1" sz="1400"/>
-              <a:t>Landscape:** </a:t>
-            </a:r>
-          </a:p>
-          <a:p>
-            <a:r>
-              <a:rPr sz="1400"/>
-              <a:t>- </a:t>
-            </a:r>
-            <a:r>
-              <a:rPr sz="1400"/>
-              <a:t>The </a:t>
-            </a:r>
-            <a:r>
-              <a:rPr sz="1400"/>
-              <a:t>legal </a:t>
-            </a:r>
-            <a:r>
-              <a:rPr sz="1400"/>
-              <a:t>landscape </a:t>
-            </a:r>
-            <a:r>
-              <a:rPr sz="1400"/>
-              <a:t>surrounding </a:t>
-            </a:r>
-            <a:r>
-              <a:rPr sz="1400"/>
-              <a:t>reverse </a:t>
-            </a:r>
-            <a:r>
-              <a:rPr sz="1400"/>
-              <a:t>engineering </a:t>
-            </a:r>
-            <a:r>
-              <a:rPr sz="1400"/>
-              <a:t>is </a:t>
-            </a:r>
-            <a:r>
-              <a:rPr sz="1400"/>
-              <a:t>complex </a:t>
-            </a:r>
-            <a:r>
-              <a:rPr sz="1400"/>
-              <a:t>and </a:t>
-            </a:r>
-            <a:r>
-              <a:rPr sz="1400"/>
-              <a:t>often </a:t>
-            </a:r>
-            <a:r>
-              <a:rPr sz="1400"/>
-              <a:t>favors </a:t>
-            </a:r>
-            <a:r>
-              <a:rPr sz="1400"/>
-              <a:t>the </a:t>
-            </a:r>
-            <a:r>
-              <a:rPr sz="1400"/>
-              <a:t>practice, </a:t>
-            </a:r>
-            <a:r>
-              <a:rPr sz="1400"/>
-              <a:t>especially </a:t>
-            </a:r>
-            <a:r>
-              <a:rPr sz="1400"/>
-              <a:t>when </a:t>
-            </a:r>
-            <a:r>
-              <a:rPr sz="1400"/>
-              <a:t>it's </a:t>
-            </a:r>
-            <a:r>
-              <a:rPr sz="1400"/>
-              <a:t>essential </a:t>
-            </a:r>
-            <a:r>
-              <a:rPr sz="1400"/>
-              <a:t>for </a:t>
-            </a:r>
-            <a:r>
-              <a:rPr sz="1400"/>
-              <a:t>achieving </a:t>
-            </a:r>
-            <a:r>
-              <a:rPr sz="1400"/>
-              <a:t>interoperability </a:t>
-            </a:r>
-            <a:r>
-              <a:rPr sz="1400"/>
-              <a:t>or </a:t>
-            </a:r>
-            <a:r>
-              <a:rPr sz="1400"/>
-              <a:t>compatibility. </a:t>
-            </a:r>
-            <a:r>
-              <a:rPr sz="1400"/>
-              <a:t>Proving </a:t>
-            </a:r>
-            <a:r>
-              <a:rPr sz="1400"/>
-              <a:t>infringement </a:t>
-            </a:r>
-            <a:r>
-              <a:rPr sz="1400"/>
-              <a:t>can </a:t>
-            </a:r>
-            <a:r>
-              <a:rPr sz="1400"/>
-              <a:t>be </a:t>
-            </a:r>
-            <a:r>
-              <a:rPr sz="1400"/>
-              <a:t>challenging, </a:t>
-            </a:r>
-            <a:r>
-              <a:rPr sz="1400"/>
-              <a:t>as </a:t>
-            </a:r>
-            <a:r>
-              <a:rPr sz="1400"/>
-              <a:t>companies </a:t>
-            </a:r>
-            <a:r>
-              <a:rPr sz="1400"/>
-              <a:t>need </a:t>
-            </a:r>
-            <a:r>
-              <a:rPr sz="1400"/>
-              <a:t>to </a:t>
-            </a:r>
-            <a:r>
-              <a:rPr sz="1400"/>
-              <a:t>demonstrate </a:t>
-            </a:r>
-            <a:r>
-              <a:rPr sz="1400"/>
-              <a:t>that </a:t>
-            </a:r>
-            <a:r>
-              <a:rPr sz="1400"/>
-              <a:t>the </a:t>
-            </a:r>
-            <a:r>
-              <a:rPr sz="1400"/>
-              <a:t>reverse </a:t>
-            </a:r>
-            <a:r>
-              <a:rPr sz="1400"/>
-              <a:t>engineering </a:t>
-            </a:r>
-            <a:r>
-              <a:rPr sz="1400"/>
-              <a:t>went </a:t>
-            </a:r>
-            <a:r>
-              <a:rPr sz="1400"/>
-              <a:t>beyond </a:t>
-            </a:r>
-            <a:r>
-              <a:rPr sz="1400"/>
-              <a:t>what </a:t>
-            </a:r>
-            <a:r>
-              <a:rPr sz="1400"/>
-              <a:t>was </a:t>
-            </a:r>
-            <a:r>
-              <a:rPr sz="1400"/>
-              <a:t>necessary </a:t>
-            </a:r>
-            <a:r>
-              <a:rPr sz="1400"/>
-              <a:t>for </a:t>
-            </a:r>
-            <a:r>
-              <a:rPr sz="1400"/>
-              <a:t>achieving </a:t>
-            </a:r>
-            <a:r>
-              <a:rPr sz="1400"/>
-              <a:t>a </a:t>
-            </a:r>
-            <a:r>
-              <a:rPr sz="1400"/>
-              <a:t>legitimate </a:t>
-            </a:r>
-            <a:r>
-              <a:rPr sz="1400"/>
-              <a:t>purpose. </a:t>
-            </a:r>
-          </a:p>
-          <a:p/>
-          <a:p>
-            <a:r>
-              <a:rPr sz="1400"/>
-              <a:t>- </a:t>
-            </a:r>
-            <a:r>
-              <a:rPr b="1" sz="1400"/>
-              <a:t>Chinese </a:t>
-            </a:r>
-            <a:r>
-              <a:rPr b="1" sz="1400"/>
-              <a:t>Wall </a:t>
-            </a:r>
-            <a:r>
-              <a:rPr b="1" sz="1400"/>
-              <a:t>Method:** </a:t>
-            </a:r>
-          </a:p>
-          <a:p>
-            <a:r>
-              <a:rPr sz="1400"/>
-              <a:t>- </a:t>
-            </a:r>
-            <a:r>
-              <a:rPr sz="1400"/>
-              <a:t>To </a:t>
-            </a:r>
-            <a:r>
-              <a:rPr sz="1400"/>
-              <a:t>mitigate </a:t>
-            </a:r>
-            <a:r>
-              <a:rPr sz="1400"/>
-              <a:t>legal </a:t>
-            </a:r>
-            <a:r>
-              <a:rPr sz="1400"/>
-              <a:t>risks, </a:t>
-            </a:r>
-            <a:r>
-              <a:rPr sz="1400"/>
-              <a:t>companies </a:t>
-            </a:r>
-            <a:r>
-              <a:rPr sz="1400"/>
-              <a:t>often </a:t>
-            </a:r>
-            <a:r>
-              <a:rPr sz="1400"/>
-              <a:t>employ </a:t>
-            </a:r>
-            <a:r>
-              <a:rPr sz="1400"/>
-              <a:t>the </a:t>
-            </a:r>
-            <a:r>
-              <a:rPr sz="1400"/>
-              <a:t>"Chinese </a:t>
-            </a:r>
-            <a:r>
-              <a:rPr sz="1400"/>
-              <a:t>Wall" </a:t>
-            </a:r>
-            <a:r>
-              <a:rPr sz="1400"/>
-              <a:t>method. </a:t>
-            </a:r>
-            <a:r>
-              <a:rPr sz="1400"/>
-              <a:t>This </a:t>
-            </a:r>
-            <a:r>
-              <a:rPr sz="1400"/>
-              <a:t>involves </a:t>
-            </a:r>
-            <a:r>
-              <a:rPr sz="1400"/>
-              <a:t>separating </a:t>
-            </a:r>
-            <a:r>
-              <a:rPr sz="1400"/>
-              <a:t>the </a:t>
-            </a:r>
-            <a:r>
-              <a:rPr sz="1400"/>
-              <a:t>team </a:t>
-            </a:r>
-            <a:r>
-              <a:rPr sz="1400"/>
-              <a:t>that </a:t>
-            </a:r>
-            <a:r>
-              <a:rPr sz="1400"/>
-              <a:t>performs </a:t>
-            </a:r>
-            <a:r>
-              <a:rPr sz="1400"/>
-              <a:t>reverse </a:t>
-            </a:r>
-            <a:r>
-              <a:rPr sz="1400"/>
-              <a:t>engineering </a:t>
-            </a:r>
-            <a:r>
-              <a:rPr sz="1400"/>
-              <a:t>from </a:t>
-            </a:r>
-            <a:r>
-              <a:rPr sz="1400"/>
-              <a:t>the </a:t>
-            </a:r>
-            <a:r>
-              <a:rPr sz="1400"/>
-              <a:t>team </a:t>
-            </a:r>
-            <a:r>
-              <a:rPr sz="1400"/>
-              <a:t>that </a:t>
-            </a:r>
-            <a:r>
-              <a:rPr sz="1400"/>
-              <a:t>develops </a:t>
-            </a:r>
-            <a:r>
-              <a:rPr sz="1400"/>
-              <a:t>the </a:t>
-            </a:r>
-            <a:r>
-              <a:rPr sz="1400"/>
-              <a:t>new </a:t>
-            </a:r>
-            <a:r>
-              <a:rPr sz="1400"/>
-              <a:t>product. </a:t>
-            </a:r>
-            <a:r>
-              <a:rPr sz="1400"/>
-              <a:t>This </a:t>
-            </a:r>
-            <a:r>
-              <a:rPr sz="1400"/>
-              <a:t>helps </a:t>
-            </a:r>
-            <a:r>
-              <a:rPr sz="1400"/>
-              <a:t>to </a:t>
-            </a:r>
-            <a:r>
-              <a:rPr sz="1400"/>
-              <a:t>ensure </a:t>
-            </a:r>
-            <a:r>
-              <a:rPr sz="1400"/>
-              <a:t>that </a:t>
-            </a:r>
-            <a:r>
-              <a:rPr sz="1400"/>
-              <a:t>any </a:t>
-            </a:r>
-            <a:r>
-              <a:rPr sz="1400"/>
-              <a:t>similarities </a:t>
-            </a:r>
-            <a:r>
-              <a:rPr sz="1400"/>
-              <a:t>between </a:t>
-            </a:r>
-            <a:r>
-              <a:rPr sz="1400"/>
-              <a:t>the </a:t>
-            </a:r>
-            <a:r>
-              <a:rPr sz="1400"/>
-              <a:t>products </a:t>
-            </a:r>
-            <a:r>
-              <a:rPr sz="1400"/>
-              <a:t>are </a:t>
-            </a:r>
-            <a:r>
-              <a:rPr sz="1400"/>
-              <a:t>due </a:t>
-            </a:r>
-            <a:r>
-              <a:rPr sz="1400"/>
-              <a:t>to </a:t>
-            </a:r>
-            <a:r>
-              <a:rPr sz="1400"/>
-              <a:t>independent </a:t>
-            </a:r>
-            <a:r>
-              <a:rPr sz="1400"/>
-              <a:t>creation </a:t>
-            </a:r>
-            <a:r>
-              <a:rPr sz="1400"/>
-              <a:t>rather </a:t>
-            </a:r>
-            <a:r>
-              <a:rPr sz="1400"/>
-              <a:t>than </a:t>
-            </a:r>
-            <a:r>
-              <a:rPr sz="1400"/>
-              <a:t>direct </a:t>
-            </a:r>
-            <a:r>
-              <a:rPr sz="1400"/>
-              <a:t>copying. </a:t>
+              <a:rPr b="1" sz="1200"/>
+              <a:t>Citation:</a:t>
+            </a:r>
+          </a:p>
+          <a:p>
+            <a:r>
+              <a:rPr sz="1200"/>
+              <a:t>* </a:t>
+            </a:r>
+            <a:r>
+              <a:rPr sz="1200"/>
+              <a:t>Zimmermann, </a:t>
+            </a:r>
+            <a:r>
+              <a:rPr sz="1200"/>
+              <a:t>D. </a:t>
+            </a:r>
+            <a:r>
+              <a:rPr sz="1200"/>
+              <a:t>(2015). </a:t>
+            </a:r>
+            <a:r>
+              <a:rPr sz="1200"/>
+              <a:t>Android </a:t>
+            </a:r>
+            <a:r>
+              <a:rPr sz="1200"/>
+              <a:t>Hacker's </a:t>
+            </a:r>
+            <a:r>
+              <a:rPr sz="1200"/>
+              <a:t>Handbook. </a:t>
+            </a:r>
+            <a:r>
+              <a:rPr sz="1200"/>
+              <a:t>John </a:t>
+            </a:r>
+            <a:r>
+              <a:rPr sz="1200"/>
+              <a:t>Wiley </a:t>
+            </a:r>
+            <a:r>
+              <a:rPr sz="1200"/>
+              <a:t>&amp; </a:t>
+            </a:r>
+            <a:r>
+              <a:rPr sz="1200"/>
+              <a:t>Sons. </a:t>
             </a:r>
           </a:p>
         </p:txBody>

</xml_diff>